<commit_message>
06-29 16:35 project init
</commit_message>
<xml_diff>
--- a/4팀 기획서 v00.pptx
+++ b/4팀 기획서 v00.pptx
@@ -5177,7 +5177,7 @@
           </a:ln>
           <a:extLst>
             <a:ext uri="{C572A759-6A51-4108-AA02-DFA0A04FC94B}">
-              <ma14:wrappingTextBoxFlag xmlns:ma14="http://schemas.microsoft.com/office/mac/drawingml/2011/main" xmlns:a14="http://schemas.microsoft.com/office/drawing/2010/main" xmlns:m="http://schemas.openxmlformats.org/officeDocument/2006/math" xmlns="" val="1"/>
+              <ma14:wrappingTextBoxFlag xmlns="" xmlns:m="http://schemas.openxmlformats.org/officeDocument/2006/math" xmlns:a14="http://schemas.microsoft.com/office/drawing/2010/main" xmlns:ma14="http://schemas.microsoft.com/office/mac/drawingml/2011/main" val="1"/>
             </a:ext>
           </a:extLst>
         </p:spPr>
@@ -5320,7 +5320,7 @@
           </a:ln>
           <a:extLst>
             <a:ext uri="{C572A759-6A51-4108-AA02-DFA0A04FC94B}">
-              <ma14:wrappingTextBoxFlag xmlns:ma14="http://schemas.microsoft.com/office/mac/drawingml/2011/main" xmlns:a14="http://schemas.microsoft.com/office/drawing/2010/main" xmlns:m="http://schemas.openxmlformats.org/officeDocument/2006/math" xmlns="" val="1"/>
+              <ma14:wrappingTextBoxFlag xmlns="" xmlns:m="http://schemas.openxmlformats.org/officeDocument/2006/math" xmlns:a14="http://schemas.microsoft.com/office/drawing/2010/main" xmlns:ma14="http://schemas.microsoft.com/office/mac/drawingml/2011/main" val="1"/>
             </a:ext>
           </a:extLst>
         </p:spPr>
@@ -6965,7 +6965,15 @@
             </a:r>
             <a:r>
               <a:rPr lang="ko-KR" altLang="en-US" dirty="0"/>
-              <a:t>를 활용한 유튜브 분석 웹 페이지 개발</a:t>
+              <a:t>를 활용한 </a:t>
+            </a:r>
+            <a:r>
+              <a:rPr lang="ko-KR" altLang="en-US" dirty="0" smtClean="0"/>
+              <a:t>서울의 미래 </a:t>
+            </a:r>
+            <a:r>
+              <a:rPr lang="ko-KR" altLang="en-US" dirty="0"/>
+              <a:t>분석 웹 페이지 개발</a:t>
             </a:r>
           </a:p>
         </p:txBody>
@@ -7073,91 +7081,6 @@
           </a:p>
         </p:txBody>
       </p:sp>
-      <p:pic>
-        <p:nvPicPr>
-          <p:cNvPr id="1026" name="Picture 2" descr="유튜브">
-            <a:extLst>
-              <a:ext uri="{FF2B5EF4-FFF2-40B4-BE49-F238E27FC236}">
-                <a16:creationId xmlns:a16="http://schemas.microsoft.com/office/drawing/2014/main" id="{27700362-793B-4E52-ADC4-6D16C741B75A}"/>
-              </a:ext>
-            </a:extLst>
-          </p:cNvPr>
-          <p:cNvPicPr>
-            <a:picLocks noChangeAspect="1" noChangeArrowheads="1"/>
-          </p:cNvPicPr>
-          <p:nvPr/>
-        </p:nvPicPr>
-        <p:blipFill rotWithShape="1">
-          <a:blip r:embed="rId2" cstate="print">
-            <a:extLst>
-              <a:ext uri="{28A0092B-C50C-407E-A947-70E740481C1C}">
-                <a14:useLocalDpi xmlns:a14="http://schemas.microsoft.com/office/drawing/2010/main" val="0"/>
-              </a:ext>
-            </a:extLst>
-          </a:blip>
-          <a:srcRect t="-1771" b="26477"/>
-          <a:stretch/>
-        </p:blipFill>
-        <p:spPr bwMode="auto">
-          <a:xfrm>
-            <a:off x="3260586" y="1457814"/>
-            <a:ext cx="4059550" cy="2952072"/>
-          </a:xfrm>
-          <a:prstGeom prst="rect">
-            <a:avLst/>
-          </a:prstGeom>
-          <a:noFill/>
-          <a:extLst>
-            <a:ext uri="{909E8E84-426E-40DD-AFC4-6F175D3DCCD1}">
-              <a14:hiddenFill xmlns:a14="http://schemas.microsoft.com/office/drawing/2010/main">
-                <a:solidFill>
-                  <a:srgbClr val="FFFFFF"/>
-                </a:solidFill>
-              </a14:hiddenFill>
-            </a:ext>
-          </a:extLst>
-        </p:spPr>
-      </p:pic>
-      <p:pic>
-        <p:nvPicPr>
-          <p:cNvPr id="1030" name="Picture 6" descr="돋보기 아이콘, 벡터 돋보기 또는 부분 확대 기호. 로열티 무료 사진 ...">
-            <a:extLst>
-              <a:ext uri="{FF2B5EF4-FFF2-40B4-BE49-F238E27FC236}">
-                <a16:creationId xmlns:a16="http://schemas.microsoft.com/office/drawing/2014/main" id="{F89AC3E6-CB72-4636-AE41-86909056E6E3}"/>
-              </a:ext>
-            </a:extLst>
-          </p:cNvPr>
-          <p:cNvPicPr>
-            <a:picLocks noChangeAspect="1" noChangeArrowheads="1"/>
-          </p:cNvPicPr>
-          <p:nvPr/>
-        </p:nvPicPr>
-        <p:blipFill>
-          <a:blip r:embed="rId3" cstate="print">
-            <a:extLst>
-              <a:ext uri="{28A0092B-C50C-407E-A947-70E740481C1C}">
-                <a14:useLocalDpi xmlns:a14="http://schemas.microsoft.com/office/drawing/2010/main" val="0"/>
-              </a:ext>
-            </a:extLst>
-          </a:blip>
-          <a:srcRect/>
-          <a:stretch>
-            <a:fillRect/>
-          </a:stretch>
-        </p:blipFill>
-        <p:spPr bwMode="auto">
-          <a:xfrm>
-            <a:off x="7000165" y="1457814"/>
-            <a:ext cx="2448272" cy="2448272"/>
-          </a:xfrm>
-          <a:prstGeom prst="rect">
-            <a:avLst/>
-          </a:prstGeom>
-          <a:solidFill>
-            <a:schemeClr val="bg1"/>
-          </a:solidFill>
-        </p:spPr>
-      </p:pic>
       <p:sp>
         <p:nvSpPr>
           <p:cNvPr id="12" name="텍스트 개체 틀 2">
@@ -7340,6 +7263,74 @@
           </a:p>
         </p:txBody>
       </p:sp>
+      <p:pic>
+        <p:nvPicPr>
+          <p:cNvPr id="6" name="그림 5"/>
+          <p:cNvPicPr>
+            <a:picLocks noChangeAspect="1"/>
+          </p:cNvPicPr>
+          <p:nvPr/>
+        </p:nvPicPr>
+        <p:blipFill>
+          <a:blip r:embed="rId2">
+            <a:extLst>
+              <a:ext uri="{28A0092B-C50C-407E-A947-70E740481C1C}">
+                <a14:useLocalDpi xmlns:a14="http://schemas.microsoft.com/office/drawing/2010/main" val="0"/>
+              </a:ext>
+            </a:extLst>
+          </a:blip>
+          <a:stretch>
+            <a:fillRect/>
+          </a:stretch>
+        </p:blipFill>
+        <p:spPr>
+          <a:xfrm>
+            <a:off x="3287688" y="2213398"/>
+            <a:ext cx="3957515" cy="2374509"/>
+          </a:xfrm>
+          <a:prstGeom prst="rect">
+            <a:avLst/>
+          </a:prstGeom>
+        </p:spPr>
+      </p:pic>
+      <p:pic>
+        <p:nvPicPr>
+          <p:cNvPr id="1030" name="Picture 6" descr="돋보기 아이콘, 벡터 돋보기 또는 부분 확대 기호. 로열티 무료 사진 ...">
+            <a:extLst>
+              <a:ext uri="{FF2B5EF4-FFF2-40B4-BE49-F238E27FC236}">
+                <a16:creationId xmlns:a16="http://schemas.microsoft.com/office/drawing/2014/main" id="{F89AC3E6-CB72-4636-AE41-86909056E6E3}"/>
+              </a:ext>
+            </a:extLst>
+          </p:cNvPr>
+          <p:cNvPicPr>
+            <a:picLocks noChangeAspect="1" noChangeArrowheads="1"/>
+          </p:cNvPicPr>
+          <p:nvPr/>
+        </p:nvPicPr>
+        <p:blipFill rotWithShape="1">
+          <a:blip r:embed="rId3" cstate="print">
+            <a:extLst>
+              <a:ext uri="{28A0092B-C50C-407E-A947-70E740481C1C}">
+                <a14:useLocalDpi xmlns:a14="http://schemas.microsoft.com/office/drawing/2010/main" val="0"/>
+              </a:ext>
+            </a:extLst>
+          </a:blip>
+          <a:srcRect l="20888" t="19524" r="17347" b="12373"/>
+          <a:stretch/>
+        </p:blipFill>
+        <p:spPr bwMode="auto">
+          <a:xfrm>
+            <a:off x="6489119" y="2130539"/>
+            <a:ext cx="1512168" cy="1667364"/>
+          </a:xfrm>
+          <a:prstGeom prst="rect">
+            <a:avLst/>
+          </a:prstGeom>
+          <a:solidFill>
+            <a:schemeClr val="bg1"/>
+          </a:solidFill>
+        </p:spPr>
+      </p:pic>
     </p:spTree>
     <p:extLst>
       <p:ext uri="{BB962C8B-B14F-4D97-AF65-F5344CB8AC3E}">
@@ -7350,6 +7341,13 @@
   <p:clrMapOvr>
     <a:masterClrMapping/>
   </p:clrMapOvr>
+  <p:timing>
+    <p:tnLst>
+      <p:par>
+        <p:cTn id="1" dur="indefinite" restart="never" nodeType="tmRoot"/>
+      </p:par>
+    </p:tnLst>
+  </p:timing>
 </p:sld>
 </file>
 
@@ -10350,6 +10348,13 @@
   <p:clrMapOvr>
     <a:masterClrMapping/>
   </p:clrMapOvr>
+  <p:timing>
+    <p:tnLst>
+      <p:par>
+        <p:cTn id="1" dur="indefinite" restart="never" nodeType="tmRoot"/>
+      </p:par>
+    </p:tnLst>
+  </p:timing>
 </p:sld>
 </file>
 
@@ -10413,14 +10418,14 @@
           <p:nvPr>
             <p:extLst>
               <p:ext uri="{D42A27DB-BD31-4B8C-83A1-F6EECF244321}">
-                <p14:modId xmlns:p14="http://schemas.microsoft.com/office/powerpoint/2010/main" val="41169453"/>
+                <p14:modId xmlns:p14="http://schemas.microsoft.com/office/powerpoint/2010/main" val="2440759818"/>
               </p:ext>
             </p:extLst>
           </p:nvPr>
         </p:nvGraphicFramePr>
         <p:xfrm>
           <a:off x="1197870" y="1268760"/>
-          <a:ext cx="9578652" cy="5138853"/>
+          <a:ext cx="9578652" cy="4792517"/>
         </p:xfrm>
         <a:graphic>
           <a:graphicData uri="http://schemas.openxmlformats.org/drawingml/2006/table">
@@ -11473,17 +11478,126 @@
                         <a:buChar char="•"/>
                       </a:pPr>
                       <a:r>
-                        <a:rPr lang="ko-KR" altLang="en-US" sz="900" dirty="0">
+                        <a:rPr lang="ko-KR" altLang="en-US" sz="900" dirty="0" smtClean="0">
                           <a:solidFill>
                             <a:schemeClr val="tx1"/>
                           </a:solidFill>
                           <a:latin typeface="+mn-ea"/>
                           <a:ea typeface="+mn-ea"/>
                         </a:rPr>
-                        <a:t>트렌드에 맞는 데이터 분석 주제를 찾기 위해 팀원들의 논의를 거쳐 현재 가장 뜨거운 동영상 플랫폼인 유튜브를 활용하기로 하였습니다</a:t>
+                        <a:t>서울시 열린 데이터</a:t>
                       </a:r>
                       <a:r>
-                        <a:rPr lang="en-US" altLang="ko-KR" sz="900" dirty="0">
+                        <a:rPr lang="ko-KR" altLang="en-US" sz="900" baseline="0" dirty="0" smtClean="0">
+                          <a:solidFill>
+                            <a:schemeClr val="tx1"/>
+                          </a:solidFill>
+                          <a:latin typeface="+mn-ea"/>
+                          <a:ea typeface="+mn-ea"/>
+                        </a:rPr>
+                        <a:t> 광장</a:t>
+                      </a:r>
+                      <a:r>
+                        <a:rPr lang="ko-KR" altLang="en-US" sz="900" dirty="0" smtClean="0">
+                          <a:solidFill>
+                            <a:schemeClr val="tx1"/>
+                          </a:solidFill>
+                          <a:latin typeface="+mn-ea"/>
+                          <a:ea typeface="+mn-ea"/>
+                        </a:rPr>
+                        <a:t>에서 다양한 데이터를 제공하고 있습니다</a:t>
+                      </a:r>
+                      <a:r>
+                        <a:rPr lang="en-US" altLang="ko-KR" sz="900" dirty="0" smtClean="0">
+                          <a:solidFill>
+                            <a:schemeClr val="tx1"/>
+                          </a:solidFill>
+                          <a:latin typeface="+mn-ea"/>
+                          <a:ea typeface="+mn-ea"/>
+                        </a:rPr>
+                        <a:t>. </a:t>
+                      </a:r>
+                      <a:r>
+                        <a:rPr lang="ko-KR" altLang="en-US" sz="900" dirty="0" smtClean="0">
+                          <a:solidFill>
+                            <a:schemeClr val="tx1"/>
+                          </a:solidFill>
+                          <a:latin typeface="+mn-ea"/>
+                          <a:ea typeface="+mn-ea"/>
+                        </a:rPr>
+                        <a:t>활용하기 좋은 데이터가 많다는 점을 고려하였습니다</a:t>
+                      </a:r>
+                      <a:r>
+                        <a:rPr lang="en-US" altLang="ko-KR" sz="900" dirty="0" smtClean="0">
+                          <a:solidFill>
+                            <a:schemeClr val="tx1"/>
+                          </a:solidFill>
+                          <a:latin typeface="+mn-ea"/>
+                          <a:ea typeface="+mn-ea"/>
+                        </a:rPr>
+                        <a:t>.</a:t>
+                      </a:r>
+                    </a:p>
+                    <a:p>
+                      <a:pPr marL="171450" indent="-171450" algn="just" latinLnBrk="1">
+                        <a:lnSpc>
+                          <a:spcPct val="130000"/>
+                        </a:lnSpc>
+                        <a:buFont typeface="Arial" panose="020B0604020202020204" pitchFamily="34" charset="0"/>
+                        <a:buChar char="•"/>
+                      </a:pPr>
+                      <a:r>
+                        <a:rPr lang="ko-KR" altLang="en-US" sz="900" dirty="0" smtClean="0">
+                          <a:solidFill>
+                            <a:schemeClr val="tx1"/>
+                          </a:solidFill>
+                          <a:latin typeface="+mn-ea"/>
+                          <a:ea typeface="+mn-ea"/>
+                        </a:rPr>
+                        <a:t>서울의 현재와 미래에 대해 데이터 분석을 하여 이용자들에게 제공하면</a:t>
+                      </a:r>
+                      <a:r>
+                        <a:rPr lang="en-US" altLang="ko-KR" sz="900" dirty="0" smtClean="0">
+                          <a:solidFill>
+                            <a:schemeClr val="tx1"/>
+                          </a:solidFill>
+                          <a:latin typeface="+mn-ea"/>
+                          <a:ea typeface="+mn-ea"/>
+                        </a:rPr>
+                        <a:t> </a:t>
+                      </a:r>
+                      <a:r>
+                        <a:rPr lang="ko-KR" altLang="en-US" sz="900" dirty="0" smtClean="0">
+                          <a:solidFill>
+                            <a:schemeClr val="tx1"/>
+                          </a:solidFill>
+                          <a:latin typeface="+mn-ea"/>
+                          <a:ea typeface="+mn-ea"/>
+                        </a:rPr>
+                        <a:t>중요한 지표들에 대해 사용자들이</a:t>
+                      </a:r>
+                      <a:r>
+                        <a:rPr lang="ko-KR" altLang="en-US" sz="900" baseline="0" dirty="0" smtClean="0">
+                          <a:solidFill>
+                            <a:schemeClr val="tx1"/>
+                          </a:solidFill>
+                          <a:latin typeface="+mn-ea"/>
+                          <a:ea typeface="+mn-ea"/>
+                        </a:rPr>
+                        <a:t> </a:t>
+                      </a:r>
+                      <a:r>
+                        <a:rPr lang="ko-KR" altLang="en-US" sz="900" dirty="0" smtClean="0">
+                          <a:solidFill>
+                            <a:schemeClr val="tx1"/>
+                          </a:solidFill>
+                          <a:latin typeface="+mn-ea"/>
+                          <a:ea typeface="+mn-ea"/>
+                        </a:rPr>
+                        <a:t>돌아볼 수 있는 계기가 될 것입니다</a:t>
+                      </a:r>
+                      <a:r>
+                        <a:rPr lang="en-US" altLang="ko-KR" sz="900" dirty="0" smtClean="0">
                           <a:solidFill>
                             <a:schemeClr val="tx1"/>
                           </a:solidFill>
@@ -12260,6 +12374,16 @@
                         <a:buChar char="•"/>
                       </a:pPr>
                       <a:r>
+                        <a:rPr lang="ko-KR" altLang="en-US" sz="900" dirty="0" smtClean="0">
+                          <a:solidFill>
+                            <a:schemeClr val="tx1"/>
+                          </a:solidFill>
+                          <a:latin typeface="+mn-ea"/>
+                          <a:ea typeface="+mn-ea"/>
+                        </a:rPr>
+                        <a:t>서울에서 제공하는 데이터들을 </a:t>
+                      </a:r>
+                      <a:r>
                         <a:rPr lang="ko-KR" altLang="en-US" sz="900" dirty="0">
                           <a:solidFill>
                             <a:schemeClr val="tx1"/>
@@ -12267,10 +12391,20 @@
                           <a:latin typeface="+mn-ea"/>
                           <a:ea typeface="+mn-ea"/>
                         </a:rPr>
-                        <a:t>유튜브를 데이터 분석을 통해 이용자가 효과적으로 트렌드를 알 수 있도록 합니다</a:t>
+                        <a:t>데이터 분석을 통해 </a:t>
                       </a:r>
                       <a:r>
-                        <a:rPr lang="en-US" altLang="ko-KR" sz="900" dirty="0">
+                        <a:rPr lang="ko-KR" altLang="en-US" sz="900" dirty="0" smtClean="0">
+                          <a:solidFill>
+                            <a:schemeClr val="tx1"/>
+                          </a:solidFill>
+                          <a:latin typeface="+mn-ea"/>
+                          <a:ea typeface="+mn-ea"/>
+                        </a:rPr>
+                        <a:t>이용자가 서울의 현재에 대한 분석된 데이터들을 시각화를 통해 다양하게 제공합니다</a:t>
+                      </a:r>
+                      <a:r>
+                        <a:rPr lang="en-US" altLang="ko-KR" sz="900" dirty="0" smtClean="0">
                           <a:solidFill>
                             <a:schemeClr val="tx1"/>
                           </a:solidFill>
@@ -12289,6 +12423,26 @@
                         <a:buChar char="•"/>
                       </a:pPr>
                       <a:r>
+                        <a:rPr lang="en-US" altLang="ko-KR" sz="900" dirty="0" smtClean="0">
+                          <a:solidFill>
+                            <a:schemeClr val="tx1"/>
+                          </a:solidFill>
+                          <a:latin typeface="+mn-ea"/>
+                          <a:ea typeface="+mn-ea"/>
+                        </a:rPr>
+                        <a:t> </a:t>
+                      </a:r>
+                      <a:r>
+                        <a:rPr lang="ko-KR" altLang="en-US" sz="900" dirty="0" smtClean="0">
+                          <a:solidFill>
+                            <a:schemeClr val="tx1"/>
+                          </a:solidFill>
+                          <a:latin typeface="+mn-ea"/>
+                          <a:ea typeface="+mn-ea"/>
+                        </a:rPr>
+                        <a:t>데이터로 </a:t>
+                      </a:r>
+                      <a:r>
                         <a:rPr lang="ko-KR" altLang="en-US" sz="900" dirty="0">
                           <a:solidFill>
                             <a:schemeClr val="tx1"/>
@@ -12296,7 +12450,7 @@
                           <a:latin typeface="+mn-ea"/>
                           <a:ea typeface="+mn-ea"/>
                         </a:rPr>
-                        <a:t>데이터로 분석</a:t>
+                        <a:t>분석</a:t>
                       </a:r>
                       <a:r>
                         <a:rPr lang="en-US" altLang="ko-KR" sz="900" dirty="0">
@@ -12316,27 +12470,17 @@
                           <a:latin typeface="+mn-ea"/>
                           <a:ea typeface="+mn-ea"/>
                         </a:rPr>
-                        <a:t>예측 모델을 만들어 트렌드 예측을 하고</a:t>
+                        <a:t>예측 모델을 </a:t>
                       </a:r>
                       <a:r>
-                        <a:rPr lang="en-US" altLang="ko-KR" sz="900" dirty="0">
+                        <a:rPr lang="ko-KR" altLang="en-US" sz="900" dirty="0" smtClean="0">
                           <a:solidFill>
                             <a:schemeClr val="tx1"/>
                           </a:solidFill>
                           <a:latin typeface="+mn-ea"/>
                           <a:ea typeface="+mn-ea"/>
                         </a:rPr>
-                        <a:t> </a:t>
-                      </a:r>
-                      <a:r>
-                        <a:rPr lang="ko-KR" altLang="en-US" sz="900" dirty="0">
-                          <a:solidFill>
-                            <a:schemeClr val="tx1"/>
-                          </a:solidFill>
-                          <a:latin typeface="+mn-ea"/>
-                          <a:ea typeface="+mn-ea"/>
-                        </a:rPr>
-                        <a:t>이러한 정보를 이용자가 활용할 수 있도록 합니다</a:t>
+                        <a:t>만들어 미래의 기초자료들을 예측하고 이용자들에게 제공합니다</a:t>
                       </a:r>
                       <a:r>
                         <a:rPr lang="en-US" altLang="ko-KR" sz="900" dirty="0" smtClean="0">
@@ -13962,194 +14106,6 @@
                         <a:buFont typeface="Arial" panose="020B0604020202020204" pitchFamily="34" charset="0"/>
                         <a:buChar char="•"/>
                       </a:pPr>
-                      <a:r>
-                        <a:rPr lang="ko-KR" altLang="en-US" sz="900" dirty="0">
-                          <a:solidFill>
-                            <a:schemeClr val="tx1"/>
-                          </a:solidFill>
-                          <a:latin typeface="+mn-ea"/>
-                          <a:ea typeface="+mn-ea"/>
-                        </a:rPr>
-                        <a:t>주간 급상승 </a:t>
-                      </a:r>
-                      <a:r>
-                        <a:rPr lang="ko-KR" altLang="en-US" sz="900" dirty="0" err="1">
-                          <a:solidFill>
-                            <a:schemeClr val="tx1"/>
-                          </a:solidFill>
-                          <a:latin typeface="+mn-ea"/>
-                          <a:ea typeface="+mn-ea"/>
-                        </a:rPr>
-                        <a:t>유튜버</a:t>
-                      </a:r>
-                      <a:r>
-                        <a:rPr lang="ko-KR" altLang="en-US" sz="900" dirty="0">
-                          <a:solidFill>
-                            <a:schemeClr val="tx1"/>
-                          </a:solidFill>
-                          <a:latin typeface="+mn-ea"/>
-                          <a:ea typeface="+mn-ea"/>
-                        </a:rPr>
-                        <a:t> </a:t>
-                      </a:r>
-                      <a:endParaRPr lang="en-US" altLang="ko-KR" sz="900" dirty="0">
-                        <a:solidFill>
-                          <a:schemeClr val="tx1"/>
-                        </a:solidFill>
-                        <a:latin typeface="+mn-ea"/>
-                        <a:ea typeface="+mn-ea"/>
-                      </a:endParaRPr>
-                    </a:p>
-                    <a:p>
-                      <a:pPr marL="171450" indent="-171450" algn="just" latinLnBrk="1">
-                        <a:lnSpc>
-                          <a:spcPct val="130000"/>
-                        </a:lnSpc>
-                        <a:buFont typeface="Arial" panose="020B0604020202020204" pitchFamily="34" charset="0"/>
-                        <a:buChar char="•"/>
-                      </a:pPr>
-                      <a:r>
-                        <a:rPr lang="ko-KR" altLang="en-US" sz="900" dirty="0">
-                          <a:solidFill>
-                            <a:schemeClr val="tx1"/>
-                          </a:solidFill>
-                          <a:latin typeface="+mn-ea"/>
-                          <a:ea typeface="+mn-ea"/>
-                        </a:rPr>
-                        <a:t>현재 인기 </a:t>
-                      </a:r>
-                      <a:r>
-                        <a:rPr lang="ko-KR" altLang="en-US" sz="900" dirty="0" err="1">
-                          <a:solidFill>
-                            <a:schemeClr val="tx1"/>
-                          </a:solidFill>
-                          <a:latin typeface="+mn-ea"/>
-                          <a:ea typeface="+mn-ea"/>
-                        </a:rPr>
-                        <a:t>카테고리랑</a:t>
-                      </a:r>
-                      <a:r>
-                        <a:rPr lang="ko-KR" altLang="en-US" sz="900" dirty="0">
-                          <a:solidFill>
-                            <a:schemeClr val="tx1"/>
-                          </a:solidFill>
-                          <a:latin typeface="+mn-ea"/>
-                          <a:ea typeface="+mn-ea"/>
-                        </a:rPr>
-                        <a:t> 인기 </a:t>
-                      </a:r>
-                      <a:r>
-                        <a:rPr lang="ko-KR" altLang="en-US" sz="900" dirty="0" err="1">
-                          <a:solidFill>
-                            <a:schemeClr val="tx1"/>
-                          </a:solidFill>
-                          <a:latin typeface="+mn-ea"/>
-                          <a:ea typeface="+mn-ea"/>
-                        </a:rPr>
-                        <a:t>유튜버가</a:t>
-                      </a:r>
-                      <a:r>
-                        <a:rPr lang="ko-KR" altLang="en-US" sz="900" dirty="0">
-                          <a:solidFill>
-                            <a:schemeClr val="tx1"/>
-                          </a:solidFill>
-                          <a:latin typeface="+mn-ea"/>
-                          <a:ea typeface="+mn-ea"/>
-                        </a:rPr>
-                        <a:t> 누구인지 순위 분석</a:t>
-                      </a:r>
-                      <a:endParaRPr lang="en-US" altLang="ko-KR" sz="900" dirty="0">
-                        <a:solidFill>
-                          <a:schemeClr val="tx1"/>
-                        </a:solidFill>
-                        <a:latin typeface="+mn-ea"/>
-                        <a:ea typeface="+mn-ea"/>
-                      </a:endParaRPr>
-                    </a:p>
-                    <a:p>
-                      <a:pPr marL="171450" indent="-171450" algn="just" latinLnBrk="1">
-                        <a:lnSpc>
-                          <a:spcPct val="130000"/>
-                        </a:lnSpc>
-                        <a:buFont typeface="Arial" panose="020B0604020202020204" pitchFamily="34" charset="0"/>
-                        <a:buChar char="•"/>
-                      </a:pPr>
-                      <a:r>
-                        <a:rPr lang="ko-KR" altLang="en-US" sz="900" dirty="0">
-                          <a:solidFill>
-                            <a:schemeClr val="tx1"/>
-                          </a:solidFill>
-                          <a:latin typeface="+mn-ea"/>
-                          <a:ea typeface="+mn-ea"/>
-                        </a:rPr>
-                        <a:t>유튜브 카테고리별 수입의 순위 및 분석 </a:t>
-                      </a:r>
-                      <a:endParaRPr lang="en-US" altLang="ko-KR" sz="900" dirty="0">
-                        <a:solidFill>
-                          <a:schemeClr val="tx1"/>
-                        </a:solidFill>
-                        <a:latin typeface="+mn-ea"/>
-                        <a:ea typeface="+mn-ea"/>
-                      </a:endParaRPr>
-                    </a:p>
-                    <a:p>
-                      <a:pPr marL="171450" indent="-171450" algn="just" latinLnBrk="1">
-                        <a:lnSpc>
-                          <a:spcPct val="130000"/>
-                        </a:lnSpc>
-                        <a:buFont typeface="Arial" panose="020B0604020202020204" pitchFamily="34" charset="0"/>
-                        <a:buChar char="•"/>
-                      </a:pPr>
-                      <a:r>
-                        <a:rPr lang="ko-KR" altLang="en-US" sz="900" dirty="0">
-                          <a:solidFill>
-                            <a:schemeClr val="tx1"/>
-                          </a:solidFill>
-                          <a:latin typeface="+mn-ea"/>
-                          <a:ea typeface="+mn-ea"/>
-                        </a:rPr>
-                        <a:t>카테고리</a:t>
-                      </a:r>
-                      <a:r>
-                        <a:rPr lang="en-US" altLang="ko-KR" sz="900" dirty="0">
-                          <a:solidFill>
-                            <a:schemeClr val="tx1"/>
-                          </a:solidFill>
-                          <a:latin typeface="+mn-ea"/>
-                          <a:ea typeface="+mn-ea"/>
-                        </a:rPr>
-                        <a:t>, </a:t>
-                      </a:r>
-                      <a:r>
-                        <a:rPr lang="ko-KR" altLang="en-US" sz="900" dirty="0">
-                          <a:solidFill>
-                            <a:schemeClr val="tx1"/>
-                          </a:solidFill>
-                          <a:latin typeface="+mn-ea"/>
-                          <a:ea typeface="+mn-ea"/>
-                        </a:rPr>
-                        <a:t>조회수</a:t>
-                      </a:r>
-                      <a:r>
-                        <a:rPr lang="en-US" altLang="ko-KR" sz="900" dirty="0">
-                          <a:solidFill>
-                            <a:schemeClr val="tx1"/>
-                          </a:solidFill>
-                          <a:latin typeface="+mn-ea"/>
-                          <a:ea typeface="+mn-ea"/>
-                        </a:rPr>
-                        <a:t>, </a:t>
-                      </a:r>
-                      <a:r>
-                        <a:rPr lang="ko-KR" altLang="en-US" sz="900" dirty="0">
-                          <a:solidFill>
-                            <a:schemeClr val="tx1"/>
-                          </a:solidFill>
-                          <a:latin typeface="+mn-ea"/>
-                          <a:ea typeface="+mn-ea"/>
-                        </a:rPr>
-                        <a:t>구독자 등의 데이터를 활용하여 다양한 예측 모델 만들기</a:t>
-                      </a:r>
                       <a:endParaRPr lang="en-US" altLang="ko-KR" sz="900" dirty="0">
                         <a:solidFill>
                           <a:schemeClr val="tx1"/>
@@ -23384,6 +23340,13 @@
   <p:clrMapOvr>
     <a:masterClrMapping/>
   </p:clrMapOvr>
+  <p:timing>
+    <p:tnLst>
+      <p:par>
+        <p:cTn id="1" dur="indefinite" restart="never" nodeType="tmRoot"/>
+      </p:par>
+    </p:tnLst>
+  </p:timing>
 </p:sld>
 </file>
 
@@ -23943,6 +23906,13 @@
   <p:clrMapOvr>
     <a:masterClrMapping/>
   </p:clrMapOvr>
+  <p:timing>
+    <p:tnLst>
+      <p:par>
+        <p:cTn id="1" dur="indefinite" restart="never" nodeType="tmRoot"/>
+      </p:par>
+    </p:tnLst>
+  </p:timing>
 </p:sld>
 </file>
 

</xml_diff>